<commit_message>
Figure out what to Git Ignore
To avoid issues when collaborating need to adjust the gitignore file for Godot 4
</commit_message>
<xml_diff>
--- a/Shadow of Aral/Shadow of Aral - Basic Files/Shadow of Aral - Image Files/Shadow of Aral - Game Objects.pptx
+++ b/Shadow of Aral/Shadow of Aral - Basic Files/Shadow of Aral - Image Files/Shadow of Aral - Game Objects.pptx
@@ -6,7 +6,6 @@
   </p:sldMasterIdLst>
   <p:sldIdLst>
     <p:sldId id="256" r:id="rId2"/>
-    <p:sldId id="257" r:id="rId3"/>
   </p:sldIdLst>
   <p:sldSz cx="12192000" cy="6858000"/>
   <p:notesSz cx="6858000" cy="9144000"/>
@@ -244,7 +243,7 @@
           <a:p>
             <a:fld id="{6039E552-8514-4143-B81B-55803499B07C}" type="datetimeFigureOut">
               <a:rPr lang="en-US" smtClean="0"/>
-              <a:t>6/22/2024</a:t>
+              <a:t>7/15/2024</a:t>
             </a:fld>
             <a:endParaRPr lang="en-US"/>
           </a:p>
@@ -414,7 +413,7 @@
           <a:p>
             <a:fld id="{6039E552-8514-4143-B81B-55803499B07C}" type="datetimeFigureOut">
               <a:rPr lang="en-US" smtClean="0"/>
-              <a:t>6/22/2024</a:t>
+              <a:t>7/15/2024</a:t>
             </a:fld>
             <a:endParaRPr lang="en-US"/>
           </a:p>
@@ -594,7 +593,7 @@
           <a:p>
             <a:fld id="{6039E552-8514-4143-B81B-55803499B07C}" type="datetimeFigureOut">
               <a:rPr lang="en-US" smtClean="0"/>
-              <a:t>6/22/2024</a:t>
+              <a:t>7/15/2024</a:t>
             </a:fld>
             <a:endParaRPr lang="en-US"/>
           </a:p>
@@ -764,7 +763,7 @@
           <a:p>
             <a:fld id="{6039E552-8514-4143-B81B-55803499B07C}" type="datetimeFigureOut">
               <a:rPr lang="en-US" smtClean="0"/>
-              <a:t>6/22/2024</a:t>
+              <a:t>7/15/2024</a:t>
             </a:fld>
             <a:endParaRPr lang="en-US"/>
           </a:p>
@@ -1010,7 +1009,7 @@
           <a:p>
             <a:fld id="{6039E552-8514-4143-B81B-55803499B07C}" type="datetimeFigureOut">
               <a:rPr lang="en-US" smtClean="0"/>
-              <a:t>6/22/2024</a:t>
+              <a:t>7/15/2024</a:t>
             </a:fld>
             <a:endParaRPr lang="en-US"/>
           </a:p>
@@ -1242,7 +1241,7 @@
           <a:p>
             <a:fld id="{6039E552-8514-4143-B81B-55803499B07C}" type="datetimeFigureOut">
               <a:rPr lang="en-US" smtClean="0"/>
-              <a:t>6/22/2024</a:t>
+              <a:t>7/15/2024</a:t>
             </a:fld>
             <a:endParaRPr lang="en-US"/>
           </a:p>
@@ -1609,7 +1608,7 @@
           <a:p>
             <a:fld id="{6039E552-8514-4143-B81B-55803499B07C}" type="datetimeFigureOut">
               <a:rPr lang="en-US" smtClean="0"/>
-              <a:t>6/22/2024</a:t>
+              <a:t>7/15/2024</a:t>
             </a:fld>
             <a:endParaRPr lang="en-US"/>
           </a:p>
@@ -1727,7 +1726,7 @@
           <a:p>
             <a:fld id="{6039E552-8514-4143-B81B-55803499B07C}" type="datetimeFigureOut">
               <a:rPr lang="en-US" smtClean="0"/>
-              <a:t>6/22/2024</a:t>
+              <a:t>7/15/2024</a:t>
             </a:fld>
             <a:endParaRPr lang="en-US"/>
           </a:p>
@@ -1822,7 +1821,7 @@
           <a:p>
             <a:fld id="{6039E552-8514-4143-B81B-55803499B07C}" type="datetimeFigureOut">
               <a:rPr lang="en-US" smtClean="0"/>
-              <a:t>6/22/2024</a:t>
+              <a:t>7/15/2024</a:t>
             </a:fld>
             <a:endParaRPr lang="en-US"/>
           </a:p>
@@ -2099,7 +2098,7 @@
           <a:p>
             <a:fld id="{6039E552-8514-4143-B81B-55803499B07C}" type="datetimeFigureOut">
               <a:rPr lang="en-US" smtClean="0"/>
-              <a:t>6/22/2024</a:t>
+              <a:t>7/15/2024</a:t>
             </a:fld>
             <a:endParaRPr lang="en-US"/>
           </a:p>
@@ -2352,7 +2351,7 @@
           <a:p>
             <a:fld id="{6039E552-8514-4143-B81B-55803499B07C}" type="datetimeFigureOut">
               <a:rPr lang="en-US" smtClean="0"/>
-              <a:t>6/22/2024</a:t>
+              <a:t>7/15/2024</a:t>
             </a:fld>
             <a:endParaRPr lang="en-US"/>
           </a:p>
@@ -2565,7 +2564,7 @@
           <a:p>
             <a:fld id="{6039E552-8514-4143-B81B-55803499B07C}" type="datetimeFigureOut">
               <a:rPr lang="en-US" smtClean="0"/>
-              <a:t>6/22/2024</a:t>
+              <a:t>7/15/2024</a:t>
             </a:fld>
             <a:endParaRPr lang="en-US"/>
           </a:p>
@@ -3353,406 +3352,6 @@
 </p:sld>
 </file>
 
-<file path=ppt/slides/slide2.xml><?xml version="1.0" encoding="utf-8"?>
-<p:sld xmlns:a="http://schemas.openxmlformats.org/drawingml/2006/main" xmlns:r="http://schemas.openxmlformats.org/officeDocument/2006/relationships" xmlns:p="http://schemas.openxmlformats.org/presentationml/2006/main">
-  <p:cSld>
-    <p:spTree>
-      <p:nvGrpSpPr>
-        <p:cNvPr id="1" name=""/>
-        <p:cNvGrpSpPr/>
-        <p:nvPr/>
-      </p:nvGrpSpPr>
-      <p:grpSpPr>
-        <a:xfrm>
-          <a:off x="0" y="0"/>
-          <a:ext cx="0" cy="0"/>
-          <a:chOff x="0" y="0"/>
-          <a:chExt cx="0" cy="0"/>
-        </a:xfrm>
-      </p:grpSpPr>
-      <p:sp>
-        <p:nvSpPr>
-          <p:cNvPr id="7" name="TextBox 6"/>
-          <p:cNvSpPr txBox="1"/>
-          <p:nvPr/>
-        </p:nvSpPr>
-        <p:spPr>
-          <a:xfrm>
-            <a:off x="102869" y="144780"/>
-            <a:ext cx="5485131" cy="2862322"/>
-          </a:xfrm>
-          <a:prstGeom prst="rect">
-            <a:avLst/>
-          </a:prstGeom>
-          <a:noFill/>
-        </p:spPr>
-        <p:txBody>
-          <a:bodyPr wrap="square" rtlCol="0">
-            <a:spAutoFit/>
-          </a:bodyPr>
-          <a:lstStyle/>
-          <a:p>
-            <a:r>
-              <a:rPr lang="en-US" dirty="0" smtClean="0">
-                <a:latin typeface="Comic Sans MS" panose="030F0702030302020204" pitchFamily="66" charset="0"/>
-              </a:rPr>
-              <a:t>Player Object</a:t>
-            </a:r>
-          </a:p>
-          <a:p>
-            <a:endParaRPr lang="en-US" sz="1200" dirty="0" smtClean="0">
-              <a:latin typeface="Comic Sans MS" panose="030F0702030302020204" pitchFamily="66" charset="0"/>
-            </a:endParaRPr>
-          </a:p>
-          <a:p>
-            <a:pPr marL="285750" indent="-285750">
-              <a:buFont typeface="Arial" panose="020B0604020202020204" pitchFamily="34" charset="0"/>
-              <a:buChar char="•"/>
-            </a:pPr>
-            <a:r>
-              <a:rPr lang="en-US" sz="1200" dirty="0" smtClean="0">
-                <a:latin typeface="Comic Sans MS" panose="030F0702030302020204" pitchFamily="66" charset="0"/>
-              </a:rPr>
-              <a:t>Head and Body</a:t>
-            </a:r>
-          </a:p>
-          <a:p>
-            <a:pPr marL="285750" indent="-285750">
-              <a:buFont typeface="Arial" panose="020B0604020202020204" pitchFamily="34" charset="0"/>
-              <a:buChar char="•"/>
-            </a:pPr>
-            <a:r>
-              <a:rPr lang="en-US" sz="1200" dirty="0" smtClean="0">
-                <a:latin typeface="Comic Sans MS" panose="030F0702030302020204" pitchFamily="66" charset="0"/>
-              </a:rPr>
-              <a:t>Legs</a:t>
-            </a:r>
-          </a:p>
-          <a:p>
-            <a:pPr marL="285750" indent="-285750">
-              <a:buFont typeface="Arial" panose="020B0604020202020204" pitchFamily="34" charset="0"/>
-              <a:buChar char="•"/>
-            </a:pPr>
-            <a:r>
-              <a:rPr lang="en-US" sz="1200" dirty="0" smtClean="0">
-                <a:latin typeface="Comic Sans MS" panose="030F0702030302020204" pitchFamily="66" charset="0"/>
-              </a:rPr>
-              <a:t>Arms and Weapons</a:t>
-            </a:r>
-          </a:p>
-          <a:p>
-            <a:endParaRPr lang="en-US" sz="1200" dirty="0" smtClean="0">
-              <a:latin typeface="Comic Sans MS" panose="030F0702030302020204" pitchFamily="66" charset="0"/>
-            </a:endParaRPr>
-          </a:p>
-          <a:p>
-            <a:endParaRPr lang="en-US" sz="1200" dirty="0" smtClean="0">
-              <a:latin typeface="Comic Sans MS" panose="030F0702030302020204" pitchFamily="66" charset="0"/>
-            </a:endParaRPr>
-          </a:p>
-          <a:p>
-            <a:r>
-              <a:rPr lang="en-US" dirty="0" smtClean="0">
-                <a:latin typeface="Comic Sans MS" panose="030F0702030302020204" pitchFamily="66" charset="0"/>
-              </a:rPr>
-              <a:t>To Do</a:t>
-            </a:r>
-          </a:p>
-          <a:p>
-            <a:endParaRPr lang="en-US" sz="1200" dirty="0">
-              <a:latin typeface="Comic Sans MS" panose="030F0702030302020204" pitchFamily="66" charset="0"/>
-            </a:endParaRPr>
-          </a:p>
-          <a:p>
-            <a:pPr marL="171450" indent="-171450">
-              <a:buFont typeface="Arial" panose="020B0604020202020204" pitchFamily="34" charset="0"/>
-              <a:buChar char="•"/>
-            </a:pPr>
-            <a:r>
-              <a:rPr lang="en-US" sz="1200" dirty="0" smtClean="0">
-                <a:latin typeface="Comic Sans MS" panose="030F0702030302020204" pitchFamily="66" charset="0"/>
-              </a:rPr>
-              <a:t>Redesign the main character (make the character more believable)</a:t>
-            </a:r>
-          </a:p>
-          <a:p>
-            <a:pPr marL="171450" indent="-171450">
-              <a:buFont typeface="Arial" panose="020B0604020202020204" pitchFamily="34" charset="0"/>
-              <a:buChar char="•"/>
-            </a:pPr>
-            <a:r>
-              <a:rPr lang="en-US" sz="1200" dirty="0" smtClean="0">
-                <a:latin typeface="Comic Sans MS" panose="030F0702030302020204" pitchFamily="66" charset="0"/>
-              </a:rPr>
-              <a:t>Create basic animations without weapon (idle, walk, run, jump, crouch)</a:t>
-            </a:r>
-          </a:p>
-          <a:p>
-            <a:pPr marL="171450" indent="-171450">
-              <a:buFont typeface="Arial" panose="020B0604020202020204" pitchFamily="34" charset="0"/>
-              <a:buChar char="•"/>
-            </a:pPr>
-            <a:r>
-              <a:rPr lang="en-US" sz="1200" dirty="0" smtClean="0">
-                <a:latin typeface="Comic Sans MS" panose="030F0702030302020204" pitchFamily="66" charset="0"/>
-              </a:rPr>
-              <a:t>Redesign the player movement (walking and jumping)</a:t>
-            </a:r>
-          </a:p>
-          <a:p>
-            <a:pPr marL="171450" indent="-171450">
-              <a:buFont typeface="Arial" panose="020B0604020202020204" pitchFamily="34" charset="0"/>
-              <a:buChar char="•"/>
-            </a:pPr>
-            <a:r>
-              <a:rPr lang="en-US" sz="1200" dirty="0" smtClean="0">
-                <a:latin typeface="Comic Sans MS" panose="030F0702030302020204" pitchFamily="66" charset="0"/>
-              </a:rPr>
-              <a:t>Design a Dynamic Shift in Camera View (In and Outside environments)</a:t>
-            </a:r>
-          </a:p>
-          <a:p>
-            <a:pPr marL="171450" indent="-171450">
-              <a:buFont typeface="Arial" panose="020B0604020202020204" pitchFamily="34" charset="0"/>
-              <a:buChar char="•"/>
-            </a:pPr>
-            <a:r>
-              <a:rPr lang="en-US" sz="1200" dirty="0" smtClean="0">
-                <a:latin typeface="Comic Sans MS" panose="030F0702030302020204" pitchFamily="66" charset="0"/>
-              </a:rPr>
-              <a:t>Then start off with the knife animation as first weapon in arms</a:t>
-            </a:r>
-          </a:p>
-        </p:txBody>
-      </p:sp>
-      <p:grpSp>
-        <p:nvGrpSpPr>
-          <p:cNvPr id="8" name="Group 7"/>
-          <p:cNvGrpSpPr/>
-          <p:nvPr/>
-        </p:nvGrpSpPr>
-        <p:grpSpPr>
-          <a:xfrm>
-            <a:off x="2515860" y="210164"/>
-            <a:ext cx="785853" cy="831893"/>
-            <a:chOff x="668010" y="1922123"/>
-            <a:chExt cx="785853" cy="831893"/>
-          </a:xfrm>
-        </p:grpSpPr>
-        <p:pic>
-          <p:nvPicPr>
-            <p:cNvPr id="5" name="Picture 4"/>
-            <p:cNvPicPr>
-              <a:picLocks noChangeAspect="1"/>
-            </p:cNvPicPr>
-            <p:nvPr/>
-          </p:nvPicPr>
-          <p:blipFill>
-            <a:blip r:embed="rId2"/>
-            <a:stretch>
-              <a:fillRect/>
-            </a:stretch>
-          </p:blipFill>
-          <p:spPr>
-            <a:xfrm>
-              <a:off x="748977" y="2455551"/>
-              <a:ext cx="247663" cy="298465"/>
-            </a:xfrm>
-            <a:prstGeom prst="rect">
-              <a:avLst/>
-            </a:prstGeom>
-          </p:spPr>
-        </p:pic>
-        <p:pic>
-          <p:nvPicPr>
-            <p:cNvPr id="4" name="Picture 3"/>
-            <p:cNvPicPr>
-              <a:picLocks noChangeAspect="1"/>
-            </p:cNvPicPr>
-            <p:nvPr/>
-          </p:nvPicPr>
-          <p:blipFill>
-            <a:blip r:embed="rId3"/>
-            <a:stretch>
-              <a:fillRect/>
-            </a:stretch>
-          </p:blipFill>
-          <p:spPr>
-            <a:xfrm>
-              <a:off x="668010" y="1922123"/>
-              <a:ext cx="342918" cy="831893"/>
-            </a:xfrm>
-            <a:prstGeom prst="rect">
-              <a:avLst/>
-            </a:prstGeom>
-          </p:spPr>
-        </p:pic>
-        <p:pic>
-          <p:nvPicPr>
-            <p:cNvPr id="6" name="Picture 5"/>
-            <p:cNvPicPr>
-              <a:picLocks noChangeAspect="1"/>
-            </p:cNvPicPr>
-            <p:nvPr/>
-          </p:nvPicPr>
-          <p:blipFill>
-            <a:blip r:embed="rId4"/>
-            <a:stretch>
-              <a:fillRect/>
-            </a:stretch>
-          </p:blipFill>
-          <p:spPr>
-            <a:xfrm>
-              <a:off x="748977" y="2226938"/>
-              <a:ext cx="704886" cy="222261"/>
-            </a:xfrm>
-            <a:prstGeom prst="rect">
-              <a:avLst/>
-            </a:prstGeom>
-          </p:spPr>
-        </p:pic>
-      </p:grpSp>
-      <p:sp>
-        <p:nvSpPr>
-          <p:cNvPr id="9" name="TextBox 8"/>
-          <p:cNvSpPr txBox="1"/>
-          <p:nvPr/>
-        </p:nvSpPr>
-        <p:spPr>
-          <a:xfrm>
-            <a:off x="6042659" y="144780"/>
-            <a:ext cx="5485131" cy="2492990"/>
-          </a:xfrm>
-          <a:prstGeom prst="rect">
-            <a:avLst/>
-          </a:prstGeom>
-          <a:noFill/>
-        </p:spPr>
-        <p:txBody>
-          <a:bodyPr wrap="square" rtlCol="0">
-            <a:spAutoFit/>
-          </a:bodyPr>
-          <a:lstStyle/>
-          <a:p>
-            <a:r>
-              <a:rPr lang="en-US" dirty="0" smtClean="0">
-                <a:latin typeface="Comic Sans MS" panose="030F0702030302020204" pitchFamily="66" charset="0"/>
-              </a:rPr>
-              <a:t>Enemy Object</a:t>
-            </a:r>
-          </a:p>
-          <a:p>
-            <a:endParaRPr lang="en-US" sz="1200" dirty="0" smtClean="0">
-              <a:latin typeface="Comic Sans MS" panose="030F0702030302020204" pitchFamily="66" charset="0"/>
-            </a:endParaRPr>
-          </a:p>
-          <a:p>
-            <a:pPr marL="285750" indent="-285750">
-              <a:buFont typeface="Arial" panose="020B0604020202020204" pitchFamily="34" charset="0"/>
-              <a:buChar char="•"/>
-            </a:pPr>
-            <a:r>
-              <a:rPr lang="en-US" sz="1200" dirty="0" smtClean="0">
-                <a:latin typeface="Comic Sans MS" panose="030F0702030302020204" pitchFamily="66" charset="0"/>
-              </a:rPr>
-              <a:t>Head and Body</a:t>
-            </a:r>
-          </a:p>
-          <a:p>
-            <a:pPr marL="285750" indent="-285750">
-              <a:buFont typeface="Arial" panose="020B0604020202020204" pitchFamily="34" charset="0"/>
-              <a:buChar char="•"/>
-            </a:pPr>
-            <a:r>
-              <a:rPr lang="en-US" sz="1200" dirty="0" smtClean="0">
-                <a:latin typeface="Comic Sans MS" panose="030F0702030302020204" pitchFamily="66" charset="0"/>
-              </a:rPr>
-              <a:t>Legs</a:t>
-            </a:r>
-          </a:p>
-          <a:p>
-            <a:pPr marL="285750" indent="-285750">
-              <a:buFont typeface="Arial" panose="020B0604020202020204" pitchFamily="34" charset="0"/>
-              <a:buChar char="•"/>
-            </a:pPr>
-            <a:r>
-              <a:rPr lang="en-US" sz="1200" dirty="0" smtClean="0">
-                <a:latin typeface="Comic Sans MS" panose="030F0702030302020204" pitchFamily="66" charset="0"/>
-              </a:rPr>
-              <a:t>Arms and Weapons</a:t>
-            </a:r>
-          </a:p>
-          <a:p>
-            <a:endParaRPr lang="en-US" sz="1200" dirty="0" smtClean="0">
-              <a:latin typeface="Comic Sans MS" panose="030F0702030302020204" pitchFamily="66" charset="0"/>
-            </a:endParaRPr>
-          </a:p>
-          <a:p>
-            <a:endParaRPr lang="en-US" sz="1200" dirty="0" smtClean="0">
-              <a:latin typeface="Comic Sans MS" panose="030F0702030302020204" pitchFamily="66" charset="0"/>
-            </a:endParaRPr>
-          </a:p>
-          <a:p>
-            <a:r>
-              <a:rPr lang="en-US" dirty="0" smtClean="0">
-                <a:latin typeface="Comic Sans MS" panose="030F0702030302020204" pitchFamily="66" charset="0"/>
-              </a:rPr>
-              <a:t>To Do</a:t>
-            </a:r>
-          </a:p>
-          <a:p>
-            <a:endParaRPr lang="en-US" sz="1200" dirty="0">
-              <a:latin typeface="Comic Sans MS" panose="030F0702030302020204" pitchFamily="66" charset="0"/>
-            </a:endParaRPr>
-          </a:p>
-          <a:p>
-            <a:pPr marL="171450" indent="-171450">
-              <a:buFont typeface="Arial" panose="020B0604020202020204" pitchFamily="34" charset="0"/>
-              <a:buChar char="•"/>
-            </a:pPr>
-            <a:r>
-              <a:rPr lang="en-US" sz="1200" dirty="0" smtClean="0">
-                <a:latin typeface="Comic Sans MS" panose="030F0702030302020204" pitchFamily="66" charset="0"/>
-              </a:rPr>
-              <a:t>Redesign the enemies</a:t>
-            </a:r>
-          </a:p>
-          <a:p>
-            <a:pPr marL="171450" indent="-171450">
-              <a:buFont typeface="Arial" panose="020B0604020202020204" pitchFamily="34" charset="0"/>
-              <a:buChar char="•"/>
-            </a:pPr>
-            <a:r>
-              <a:rPr lang="en-US" sz="1200" dirty="0" smtClean="0">
-                <a:latin typeface="Comic Sans MS" panose="030F0702030302020204" pitchFamily="66" charset="0"/>
-              </a:rPr>
-              <a:t>Basic enemy animations</a:t>
-            </a:r>
-          </a:p>
-          <a:p>
-            <a:pPr marL="171450" indent="-171450">
-              <a:buFont typeface="Arial" panose="020B0604020202020204" pitchFamily="34" charset="0"/>
-              <a:buChar char="•"/>
-            </a:pPr>
-            <a:endParaRPr lang="en-US" sz="1200" dirty="0" smtClean="0">
-              <a:latin typeface="Comic Sans MS" panose="030F0702030302020204" pitchFamily="66" charset="0"/>
-            </a:endParaRPr>
-          </a:p>
-        </p:txBody>
-      </p:sp>
-    </p:spTree>
-    <p:extLst>
-      <p:ext uri="{BB962C8B-B14F-4D97-AF65-F5344CB8AC3E}">
-        <p14:creationId xmlns:p14="http://schemas.microsoft.com/office/powerpoint/2010/main" val="767795460"/>
-      </p:ext>
-    </p:extLst>
-  </p:cSld>
-  <p:clrMapOvr>
-    <a:masterClrMapping/>
-  </p:clrMapOvr>
-</p:sld>
-</file>
-
 <file path=ppt/theme/theme1.xml><?xml version="1.0" encoding="utf-8"?>
 <a:theme xmlns:a="http://schemas.openxmlformats.org/drawingml/2006/main" name="Office Theme">
   <a:themeElements>

</xml_diff>